<commit_message>
Added up to requirement RCL.SS.MOP3
</commit_message>
<xml_diff>
--- a/CMQA/Presentations/Tom Slides/Tom Slides.pptx
+++ b/CMQA/Presentations/Tom Slides/Tom Slides.pptx
@@ -9,6 +9,8 @@
     <p:sldId id="258" r:id="rId3"/>
     <p:sldId id="259" r:id="rId4"/>
     <p:sldId id="260" r:id="rId5"/>
+    <p:sldId id="261" r:id="rId6"/>
+    <p:sldId id="262" r:id="rId7"/>
   </p:sldIdLst>
   <p:sldSz cx="9144000" cy="6858000" type="screen4x3"/>
   <p:notesSz cx="6858000" cy="9144000"/>
@@ -5391,6 +5393,1042 @@
               <a:latin typeface="Arial" pitchFamily="34" charset="0"/>
               <a:cs typeface="Arial" pitchFamily="34" charset="0"/>
             </a:endParaRPr>
+          </a:p>
+        </p:txBody>
+      </p:sp>
+    </p:spTree>
+    <p:extLst>
+      <p:ext uri="{BB962C8B-B14F-4D97-AF65-F5344CB8AC3E}">
+        <p14:creationId xmlns:p14="http://schemas.microsoft.com/office/powerpoint/2010/main" xmlns="" val="2711901525"/>
+      </p:ext>
+    </p:extLst>
+  </p:cSld>
+  <p:clrMapOvr>
+    <a:masterClrMapping/>
+  </p:clrMapOvr>
+  <p:timing>
+    <p:tnLst>
+      <p:par>
+        <p:cTn id="1" dur="indefinite" restart="never" nodeType="tmRoot"/>
+      </p:par>
+    </p:tnLst>
+  </p:timing>
+</p:sld>
+</file>
+
+<file path=ppt/slides/slide5.xml><?xml version="1.0" encoding="utf-8"?>
+<p:sld xmlns:a="http://schemas.openxmlformats.org/drawingml/2006/main" xmlns:r="http://schemas.openxmlformats.org/officeDocument/2006/relationships" xmlns:p="http://schemas.openxmlformats.org/presentationml/2006/main">
+  <p:cSld>
+    <p:spTree>
+      <p:nvGrpSpPr>
+        <p:cNvPr id="1" name=""/>
+        <p:cNvGrpSpPr/>
+        <p:nvPr/>
+      </p:nvGrpSpPr>
+      <p:grpSpPr>
+        <a:xfrm>
+          <a:off x="0" y="0"/>
+          <a:ext cx="0" cy="0"/>
+          <a:chOff x="0" y="0"/>
+          <a:chExt cx="0" cy="0"/>
+        </a:xfrm>
+      </p:grpSpPr>
+      <p:graphicFrame>
+        <p:nvGraphicFramePr>
+          <p:cNvPr id="4" name="Content Placeholder 3"/>
+          <p:cNvGraphicFramePr>
+            <a:graphicFrameLocks noGrp="1"/>
+          </p:cNvGraphicFramePr>
+          <p:nvPr>
+            <p:ph idx="1"/>
+            <p:extLst>
+              <p:ext uri="{D42A27DB-BD31-4B8C-83A1-F6EECF244321}">
+                <p14:modId xmlns:p14="http://schemas.microsoft.com/office/powerpoint/2010/main" xmlns="" val="1483644448"/>
+              </p:ext>
+            </p:extLst>
+          </p:nvPr>
+        </p:nvGraphicFramePr>
+        <p:xfrm>
+          <a:off x="533400" y="1143000"/>
+          <a:ext cx="8229600" cy="1381760"/>
+        </p:xfrm>
+        <a:graphic>
+          <a:graphicData uri="http://schemas.openxmlformats.org/drawingml/2006/table">
+            <a:tbl>
+              <a:tblPr firstRow="1" bandRow="1">
+                <a:tableStyleId>{5C22544A-7EE6-4342-B048-85BDC9FD1C3A}</a:tableStyleId>
+              </a:tblPr>
+              <a:tblGrid>
+                <a:gridCol w="3200400"/>
+                <a:gridCol w="5029200"/>
+              </a:tblGrid>
+              <a:tr h="370840">
+                <a:tc>
+                  <a:txBody>
+                    <a:bodyPr/>
+                    <a:lstStyle/>
+                    <a:p>
+                      <a:r>
+                        <a:rPr lang="en-US" b="0" dirty="0" smtClean="0">
+                          <a:solidFill>
+                            <a:schemeClr val="bg1"/>
+                          </a:solidFill>
+                        </a:rPr>
+                        <a:t> RVM Requirement Number</a:t>
+                      </a:r>
+                      <a:endParaRPr lang="en-US" b="0" dirty="0">
+                        <a:solidFill>
+                          <a:schemeClr val="bg1"/>
+                        </a:solidFill>
+                      </a:endParaRPr>
+                    </a:p>
+                  </a:txBody>
+                  <a:tcPr anchor="ctr">
+                    <a:lnL w="12700" cap="flat" cmpd="sng" algn="ctr">
+                      <a:solidFill>
+                        <a:schemeClr val="tx1"/>
+                      </a:solidFill>
+                      <a:prstDash val="solid"/>
+                      <a:round/>
+                      <a:headEnd type="none" w="med" len="med"/>
+                      <a:tailEnd type="none" w="med" len="med"/>
+                    </a:lnL>
+                    <a:lnR w="12700" cap="flat" cmpd="sng" algn="ctr">
+                      <a:solidFill>
+                        <a:schemeClr val="tx1"/>
+                      </a:solidFill>
+                      <a:prstDash val="solid"/>
+                      <a:round/>
+                      <a:headEnd type="none" w="med" len="med"/>
+                      <a:tailEnd type="none" w="med" len="med"/>
+                    </a:lnR>
+                    <a:lnT w="12700" cap="flat" cmpd="sng" algn="ctr">
+                      <a:solidFill>
+                        <a:schemeClr val="tx1"/>
+                      </a:solidFill>
+                      <a:prstDash val="solid"/>
+                      <a:round/>
+                      <a:headEnd type="none" w="med" len="med"/>
+                      <a:tailEnd type="none" w="med" len="med"/>
+                    </a:lnT>
+                    <a:lnB w="12700" cap="flat" cmpd="sng" algn="ctr">
+                      <a:solidFill>
+                        <a:schemeClr val="tx1"/>
+                      </a:solidFill>
+                      <a:prstDash val="solid"/>
+                      <a:round/>
+                      <a:headEnd type="none" w="med" len="med"/>
+                      <a:tailEnd type="none" w="med" len="med"/>
+                    </a:lnB>
+                    <a:solidFill>
+                      <a:schemeClr val="tx2">
+                        <a:lumMod val="75000"/>
+                      </a:schemeClr>
+                    </a:solidFill>
+                  </a:tcPr>
+                </a:tc>
+                <a:tc>
+                  <a:txBody>
+                    <a:bodyPr/>
+                    <a:lstStyle/>
+                    <a:p>
+                      <a:r>
+                        <a:rPr lang="en-US" b="1" dirty="0" smtClean="0">
+                          <a:solidFill>
+                            <a:schemeClr val="tx1"/>
+                          </a:solidFill>
+                        </a:rPr>
+                        <a:t>RCL.SS.MOP2</a:t>
+                      </a:r>
+                      <a:endParaRPr lang="en-US" b="1" dirty="0">
+                        <a:solidFill>
+                          <a:schemeClr val="tx1"/>
+                        </a:solidFill>
+                      </a:endParaRPr>
+                    </a:p>
+                  </a:txBody>
+                  <a:tcPr>
+                    <a:lnL w="12700" cap="flat" cmpd="sng" algn="ctr">
+                      <a:solidFill>
+                        <a:schemeClr val="tx1"/>
+                      </a:solidFill>
+                      <a:prstDash val="solid"/>
+                      <a:round/>
+                      <a:headEnd type="none" w="med" len="med"/>
+                      <a:tailEnd type="none" w="med" len="med"/>
+                    </a:lnL>
+                    <a:lnR w="12700" cap="flat" cmpd="sng" algn="ctr">
+                      <a:solidFill>
+                        <a:schemeClr val="tx1"/>
+                      </a:solidFill>
+                      <a:prstDash val="solid"/>
+                      <a:round/>
+                      <a:headEnd type="none" w="med" len="med"/>
+                      <a:tailEnd type="none" w="med" len="med"/>
+                    </a:lnR>
+                    <a:lnT w="12700" cap="flat" cmpd="sng" algn="ctr">
+                      <a:solidFill>
+                        <a:schemeClr val="tx1"/>
+                      </a:solidFill>
+                      <a:prstDash val="solid"/>
+                      <a:round/>
+                      <a:headEnd type="none" w="med" len="med"/>
+                      <a:tailEnd type="none" w="med" len="med"/>
+                    </a:lnT>
+                    <a:lnB w="12700" cap="flat" cmpd="sng" algn="ctr">
+                      <a:solidFill>
+                        <a:schemeClr val="tx1"/>
+                      </a:solidFill>
+                      <a:prstDash val="solid"/>
+                      <a:round/>
+                      <a:headEnd type="none" w="med" len="med"/>
+                      <a:tailEnd type="none" w="med" len="med"/>
+                    </a:lnB>
+                    <a:solidFill>
+                      <a:schemeClr val="tx2">
+                        <a:lumMod val="40000"/>
+                        <a:lumOff val="60000"/>
+                      </a:schemeClr>
+                    </a:solidFill>
+                  </a:tcPr>
+                </a:tc>
+              </a:tr>
+              <a:tr h="370840">
+                <a:tc>
+                  <a:txBody>
+                    <a:bodyPr/>
+                    <a:lstStyle/>
+                    <a:p>
+                      <a:r>
+                        <a:rPr lang="en-US" b="0" dirty="0" smtClean="0">
+                          <a:solidFill>
+                            <a:schemeClr val="bg1"/>
+                          </a:solidFill>
+                        </a:rPr>
+                        <a:t>RVM </a:t>
+                      </a:r>
+                      <a:r>
+                        <a:rPr lang="en-US" b="0" baseline="0" dirty="0" smtClean="0">
+                          <a:solidFill>
+                            <a:schemeClr val="bg1"/>
+                          </a:solidFill>
+                        </a:rPr>
+                        <a:t>Requirement Wording</a:t>
+                      </a:r>
+                      <a:endParaRPr lang="en-US" b="0" dirty="0">
+                        <a:solidFill>
+                          <a:schemeClr val="bg1"/>
+                        </a:solidFill>
+                      </a:endParaRPr>
+                    </a:p>
+                  </a:txBody>
+                  <a:tcPr anchor="ctr">
+                    <a:lnL w="12700" cap="flat" cmpd="sng" algn="ctr">
+                      <a:solidFill>
+                        <a:schemeClr val="tx1"/>
+                      </a:solidFill>
+                      <a:prstDash val="solid"/>
+                      <a:round/>
+                      <a:headEnd type="none" w="med" len="med"/>
+                      <a:tailEnd type="none" w="med" len="med"/>
+                    </a:lnL>
+                    <a:lnR w="12700" cap="flat" cmpd="sng" algn="ctr">
+                      <a:solidFill>
+                        <a:schemeClr val="tx1"/>
+                      </a:solidFill>
+                      <a:prstDash val="solid"/>
+                      <a:round/>
+                      <a:headEnd type="none" w="med" len="med"/>
+                      <a:tailEnd type="none" w="med" len="med"/>
+                    </a:lnR>
+                    <a:lnT w="12700" cap="flat" cmpd="sng" algn="ctr">
+                      <a:solidFill>
+                        <a:schemeClr val="tx1"/>
+                      </a:solidFill>
+                      <a:prstDash val="solid"/>
+                      <a:round/>
+                      <a:headEnd type="none" w="med" len="med"/>
+                      <a:tailEnd type="none" w="med" len="med"/>
+                    </a:lnT>
+                    <a:lnB w="12700" cap="flat" cmpd="sng" algn="ctr">
+                      <a:solidFill>
+                        <a:schemeClr val="tx1"/>
+                      </a:solidFill>
+                      <a:prstDash val="solid"/>
+                      <a:round/>
+                      <a:headEnd type="none" w="med" len="med"/>
+                      <a:tailEnd type="none" w="med" len="med"/>
+                    </a:lnB>
+                    <a:solidFill>
+                      <a:schemeClr val="tx2">
+                        <a:lumMod val="75000"/>
+                      </a:schemeClr>
+                    </a:solidFill>
+                  </a:tcPr>
+                </a:tc>
+                <a:tc>
+                  <a:txBody>
+                    <a:bodyPr/>
+                    <a:lstStyle/>
+                    <a:p>
+                      <a:r>
+                        <a:rPr lang="en-US" b="1" i="1" dirty="0" smtClean="0">
+                          <a:solidFill>
+                            <a:schemeClr val="tx1"/>
+                          </a:solidFill>
+                        </a:rPr>
+                        <a:t>“Jade and</a:t>
+                      </a:r>
+                      <a:r>
+                        <a:rPr lang="en-US" b="1" i="1" baseline="0" dirty="0" smtClean="0">
+                          <a:solidFill>
+                            <a:schemeClr val="tx1"/>
+                          </a:solidFill>
+                        </a:rPr>
+                        <a:t> Turquoise Shall Achieve a Local Slew Rate of Less Than 1 deg/s</a:t>
+                      </a:r>
+                      <a:r>
+                        <a:rPr lang="en-US" b="1" i="1" dirty="0" smtClean="0">
+                          <a:solidFill>
+                            <a:schemeClr val="tx1"/>
+                          </a:solidFill>
+                        </a:rPr>
+                        <a:t>”</a:t>
+                      </a:r>
+                      <a:endParaRPr lang="en-US" b="1" i="1" dirty="0">
+                        <a:solidFill>
+                          <a:schemeClr val="tx1"/>
+                        </a:solidFill>
+                      </a:endParaRPr>
+                    </a:p>
+                  </a:txBody>
+                  <a:tcPr>
+                    <a:lnL w="12700" cap="flat" cmpd="sng" algn="ctr">
+                      <a:solidFill>
+                        <a:schemeClr val="tx1"/>
+                      </a:solidFill>
+                      <a:prstDash val="solid"/>
+                      <a:round/>
+                      <a:headEnd type="none" w="med" len="med"/>
+                      <a:tailEnd type="none" w="med" len="med"/>
+                    </a:lnL>
+                    <a:lnR w="12700" cap="flat" cmpd="sng" algn="ctr">
+                      <a:solidFill>
+                        <a:schemeClr val="tx1"/>
+                      </a:solidFill>
+                      <a:prstDash val="solid"/>
+                      <a:round/>
+                      <a:headEnd type="none" w="med" len="med"/>
+                      <a:tailEnd type="none" w="med" len="med"/>
+                    </a:lnR>
+                    <a:lnT w="12700" cap="flat" cmpd="sng" algn="ctr">
+                      <a:solidFill>
+                        <a:schemeClr val="tx1"/>
+                      </a:solidFill>
+                      <a:prstDash val="solid"/>
+                      <a:round/>
+                      <a:headEnd type="none" w="med" len="med"/>
+                      <a:tailEnd type="none" w="med" len="med"/>
+                    </a:lnT>
+                    <a:lnB w="12700" cap="flat" cmpd="sng" algn="ctr">
+                      <a:solidFill>
+                        <a:schemeClr val="tx1"/>
+                      </a:solidFill>
+                      <a:prstDash val="solid"/>
+                      <a:round/>
+                      <a:headEnd type="none" w="med" len="med"/>
+                      <a:tailEnd type="none" w="med" len="med"/>
+                    </a:lnB>
+                    <a:solidFill>
+                      <a:schemeClr val="tx2">
+                        <a:lumMod val="40000"/>
+                        <a:lumOff val="60000"/>
+                      </a:schemeClr>
+                    </a:solidFill>
+                  </a:tcPr>
+                </a:tc>
+              </a:tr>
+              <a:tr h="370840">
+                <a:tc>
+                  <a:txBody>
+                    <a:bodyPr/>
+                    <a:lstStyle/>
+                    <a:p>
+                      <a:r>
+                        <a:rPr lang="en-US" b="0" dirty="0" smtClean="0">
+                          <a:solidFill>
+                            <a:schemeClr val="bg1"/>
+                          </a:solidFill>
+                        </a:rPr>
+                        <a:t>Validation Method</a:t>
+                      </a:r>
+                      <a:endParaRPr lang="en-US" b="0" dirty="0">
+                        <a:solidFill>
+                          <a:schemeClr val="bg1"/>
+                        </a:solidFill>
+                      </a:endParaRPr>
+                    </a:p>
+                  </a:txBody>
+                  <a:tcPr anchor="ctr">
+                    <a:lnL w="12700" cap="flat" cmpd="sng" algn="ctr">
+                      <a:solidFill>
+                        <a:schemeClr val="tx1"/>
+                      </a:solidFill>
+                      <a:prstDash val="solid"/>
+                      <a:round/>
+                      <a:headEnd type="none" w="med" len="med"/>
+                      <a:tailEnd type="none" w="med" len="med"/>
+                    </a:lnL>
+                    <a:lnR w="12700" cap="flat" cmpd="sng" algn="ctr">
+                      <a:solidFill>
+                        <a:schemeClr val="tx1"/>
+                      </a:solidFill>
+                      <a:prstDash val="solid"/>
+                      <a:round/>
+                      <a:headEnd type="none" w="med" len="med"/>
+                      <a:tailEnd type="none" w="med" len="med"/>
+                    </a:lnR>
+                    <a:lnT w="12700" cap="flat" cmpd="sng" algn="ctr">
+                      <a:solidFill>
+                        <a:schemeClr val="tx1"/>
+                      </a:solidFill>
+                      <a:prstDash val="solid"/>
+                      <a:round/>
+                      <a:headEnd type="none" w="med" len="med"/>
+                      <a:tailEnd type="none" w="med" len="med"/>
+                    </a:lnT>
+                    <a:lnB w="12700" cap="flat" cmpd="sng" algn="ctr">
+                      <a:solidFill>
+                        <a:schemeClr val="tx1"/>
+                      </a:solidFill>
+                      <a:prstDash val="solid"/>
+                      <a:round/>
+                      <a:headEnd type="none" w="med" len="med"/>
+                      <a:tailEnd type="none" w="med" len="med"/>
+                    </a:lnB>
+                    <a:solidFill>
+                      <a:schemeClr val="tx2">
+                        <a:lumMod val="75000"/>
+                      </a:schemeClr>
+                    </a:solidFill>
+                  </a:tcPr>
+                </a:tc>
+                <a:tc>
+                  <a:txBody>
+                    <a:bodyPr/>
+                    <a:lstStyle/>
+                    <a:p>
+                      <a:r>
+                        <a:rPr lang="en-US" b="1" i="0" dirty="0" smtClean="0">
+                          <a:solidFill>
+                            <a:schemeClr val="tx1"/>
+                          </a:solidFill>
+                        </a:rPr>
+                        <a:t>Analyze</a:t>
+                      </a:r>
+                      <a:endParaRPr lang="en-US" b="1" i="0" dirty="0">
+                        <a:solidFill>
+                          <a:schemeClr val="tx1"/>
+                        </a:solidFill>
+                      </a:endParaRPr>
+                    </a:p>
+                  </a:txBody>
+                  <a:tcPr>
+                    <a:lnL w="12700" cap="flat" cmpd="sng" algn="ctr">
+                      <a:solidFill>
+                        <a:schemeClr val="tx1"/>
+                      </a:solidFill>
+                      <a:prstDash val="solid"/>
+                      <a:round/>
+                      <a:headEnd type="none" w="med" len="med"/>
+                      <a:tailEnd type="none" w="med" len="med"/>
+                    </a:lnL>
+                    <a:lnR w="12700" cap="flat" cmpd="sng" algn="ctr">
+                      <a:solidFill>
+                        <a:schemeClr val="tx1"/>
+                      </a:solidFill>
+                      <a:prstDash val="solid"/>
+                      <a:round/>
+                      <a:headEnd type="none" w="med" len="med"/>
+                      <a:tailEnd type="none" w="med" len="med"/>
+                    </a:lnR>
+                    <a:lnT w="12700" cap="flat" cmpd="sng" algn="ctr">
+                      <a:solidFill>
+                        <a:schemeClr val="tx1"/>
+                      </a:solidFill>
+                      <a:prstDash val="solid"/>
+                      <a:round/>
+                      <a:headEnd type="none" w="med" len="med"/>
+                      <a:tailEnd type="none" w="med" len="med"/>
+                    </a:lnT>
+                    <a:lnB w="12700" cap="flat" cmpd="sng" algn="ctr">
+                      <a:solidFill>
+                        <a:schemeClr val="tx1"/>
+                      </a:solidFill>
+                      <a:prstDash val="solid"/>
+                      <a:round/>
+                      <a:headEnd type="none" w="med" len="med"/>
+                      <a:tailEnd type="none" w="med" len="med"/>
+                    </a:lnB>
+                    <a:solidFill>
+                      <a:schemeClr val="tx2">
+                        <a:lumMod val="40000"/>
+                        <a:lumOff val="60000"/>
+                      </a:schemeClr>
+                    </a:solidFill>
+                  </a:tcPr>
+                </a:tc>
+              </a:tr>
+            </a:tbl>
+          </a:graphicData>
+        </a:graphic>
+      </p:graphicFrame>
+      <p:sp>
+        <p:nvSpPr>
+          <p:cNvPr id="5" name="TextBox 4"/>
+          <p:cNvSpPr txBox="1"/>
+          <p:nvPr/>
+        </p:nvSpPr>
+        <p:spPr>
+          <a:xfrm>
+            <a:off x="457200" y="2971800"/>
+            <a:ext cx="8305800" cy="1200329"/>
+          </a:xfrm>
+          <a:prstGeom prst="rect">
+            <a:avLst/>
+          </a:prstGeom>
+          <a:noFill/>
+        </p:spPr>
+        <p:txBody>
+          <a:bodyPr wrap="square" rtlCol="0">
+            <a:spAutoFit/>
+          </a:bodyPr>
+          <a:lstStyle/>
+          <a:p>
+            <a:pPr algn="just"/>
+            <a:r>
+              <a:rPr lang="en-US" sz="2400" b="1" dirty="0" smtClean="0"/>
+              <a:t>Based on slew rate data obtained from previous CubeSat missions, a CubeSat with a slew rate of less than 1 deg/s can be considered to have attained stability</a:t>
+            </a:r>
+            <a:endParaRPr lang="en-US" sz="2400" b="1" dirty="0" smtClean="0"/>
+          </a:p>
+        </p:txBody>
+      </p:sp>
+    </p:spTree>
+    <p:extLst>
+      <p:ext uri="{BB962C8B-B14F-4D97-AF65-F5344CB8AC3E}">
+        <p14:creationId xmlns:p14="http://schemas.microsoft.com/office/powerpoint/2010/main" xmlns="" val="2711901525"/>
+      </p:ext>
+    </p:extLst>
+  </p:cSld>
+  <p:clrMapOvr>
+    <a:masterClrMapping/>
+  </p:clrMapOvr>
+  <p:timing>
+    <p:tnLst>
+      <p:par>
+        <p:cTn id="1" dur="indefinite" restart="never" nodeType="tmRoot"/>
+      </p:par>
+    </p:tnLst>
+  </p:timing>
+</p:sld>
+</file>
+
+<file path=ppt/slides/slide6.xml><?xml version="1.0" encoding="utf-8"?>
+<p:sld xmlns:a="http://schemas.openxmlformats.org/drawingml/2006/main" xmlns:r="http://schemas.openxmlformats.org/officeDocument/2006/relationships" xmlns:p="http://schemas.openxmlformats.org/presentationml/2006/main">
+  <p:cSld>
+    <p:spTree>
+      <p:nvGrpSpPr>
+        <p:cNvPr id="1" name=""/>
+        <p:cNvGrpSpPr/>
+        <p:nvPr/>
+      </p:nvGrpSpPr>
+      <p:grpSpPr>
+        <a:xfrm>
+          <a:off x="0" y="0"/>
+          <a:ext cx="0" cy="0"/>
+          <a:chOff x="0" y="0"/>
+          <a:chExt cx="0" cy="0"/>
+        </a:xfrm>
+      </p:grpSpPr>
+      <p:graphicFrame>
+        <p:nvGraphicFramePr>
+          <p:cNvPr id="4" name="Content Placeholder 3"/>
+          <p:cNvGraphicFramePr>
+            <a:graphicFrameLocks noGrp="1"/>
+          </p:cNvGraphicFramePr>
+          <p:nvPr>
+            <p:ph idx="1"/>
+            <p:extLst>
+              <p:ext uri="{D42A27DB-BD31-4B8C-83A1-F6EECF244321}">
+                <p14:modId xmlns:p14="http://schemas.microsoft.com/office/powerpoint/2010/main" xmlns="" val="1483644448"/>
+              </p:ext>
+            </p:extLst>
+          </p:nvPr>
+        </p:nvGraphicFramePr>
+        <p:xfrm>
+          <a:off x="533400" y="1143000"/>
+          <a:ext cx="8229600" cy="1656080"/>
+        </p:xfrm>
+        <a:graphic>
+          <a:graphicData uri="http://schemas.openxmlformats.org/drawingml/2006/table">
+            <a:tbl>
+              <a:tblPr firstRow="1" bandRow="1">
+                <a:tableStyleId>{5C22544A-7EE6-4342-B048-85BDC9FD1C3A}</a:tableStyleId>
+              </a:tblPr>
+              <a:tblGrid>
+                <a:gridCol w="3200400"/>
+                <a:gridCol w="5029200"/>
+              </a:tblGrid>
+              <a:tr h="370840">
+                <a:tc>
+                  <a:txBody>
+                    <a:bodyPr/>
+                    <a:lstStyle/>
+                    <a:p>
+                      <a:r>
+                        <a:rPr lang="en-US" b="0" dirty="0" smtClean="0">
+                          <a:solidFill>
+                            <a:schemeClr val="bg1"/>
+                          </a:solidFill>
+                        </a:rPr>
+                        <a:t> RVM Requirement Number</a:t>
+                      </a:r>
+                      <a:endParaRPr lang="en-US" b="0" dirty="0">
+                        <a:solidFill>
+                          <a:schemeClr val="bg1"/>
+                        </a:solidFill>
+                      </a:endParaRPr>
+                    </a:p>
+                  </a:txBody>
+                  <a:tcPr anchor="ctr">
+                    <a:lnL w="12700" cap="flat" cmpd="sng" algn="ctr">
+                      <a:solidFill>
+                        <a:schemeClr val="tx1"/>
+                      </a:solidFill>
+                      <a:prstDash val="solid"/>
+                      <a:round/>
+                      <a:headEnd type="none" w="med" len="med"/>
+                      <a:tailEnd type="none" w="med" len="med"/>
+                    </a:lnL>
+                    <a:lnR w="12700" cap="flat" cmpd="sng" algn="ctr">
+                      <a:solidFill>
+                        <a:schemeClr val="tx1"/>
+                      </a:solidFill>
+                      <a:prstDash val="solid"/>
+                      <a:round/>
+                      <a:headEnd type="none" w="med" len="med"/>
+                      <a:tailEnd type="none" w="med" len="med"/>
+                    </a:lnR>
+                    <a:lnT w="12700" cap="flat" cmpd="sng" algn="ctr">
+                      <a:solidFill>
+                        <a:schemeClr val="tx1"/>
+                      </a:solidFill>
+                      <a:prstDash val="solid"/>
+                      <a:round/>
+                      <a:headEnd type="none" w="med" len="med"/>
+                      <a:tailEnd type="none" w="med" len="med"/>
+                    </a:lnT>
+                    <a:lnB w="12700" cap="flat" cmpd="sng" algn="ctr">
+                      <a:solidFill>
+                        <a:schemeClr val="tx1"/>
+                      </a:solidFill>
+                      <a:prstDash val="solid"/>
+                      <a:round/>
+                      <a:headEnd type="none" w="med" len="med"/>
+                      <a:tailEnd type="none" w="med" len="med"/>
+                    </a:lnB>
+                    <a:solidFill>
+                      <a:schemeClr val="tx2">
+                        <a:lumMod val="75000"/>
+                      </a:schemeClr>
+                    </a:solidFill>
+                  </a:tcPr>
+                </a:tc>
+                <a:tc>
+                  <a:txBody>
+                    <a:bodyPr/>
+                    <a:lstStyle/>
+                    <a:p>
+                      <a:r>
+                        <a:rPr lang="en-US" b="1" dirty="0" smtClean="0">
+                          <a:solidFill>
+                            <a:schemeClr val="tx1"/>
+                          </a:solidFill>
+                        </a:rPr>
+                        <a:t>RCL.SS.MOP3</a:t>
+                      </a:r>
+                      <a:endParaRPr lang="en-US" b="1" dirty="0">
+                        <a:solidFill>
+                          <a:schemeClr val="tx1"/>
+                        </a:solidFill>
+                      </a:endParaRPr>
+                    </a:p>
+                  </a:txBody>
+                  <a:tcPr>
+                    <a:lnL w="12700" cap="flat" cmpd="sng" algn="ctr">
+                      <a:solidFill>
+                        <a:schemeClr val="tx1"/>
+                      </a:solidFill>
+                      <a:prstDash val="solid"/>
+                      <a:round/>
+                      <a:headEnd type="none" w="med" len="med"/>
+                      <a:tailEnd type="none" w="med" len="med"/>
+                    </a:lnL>
+                    <a:lnR w="12700" cap="flat" cmpd="sng" algn="ctr">
+                      <a:solidFill>
+                        <a:schemeClr val="tx1"/>
+                      </a:solidFill>
+                      <a:prstDash val="solid"/>
+                      <a:round/>
+                      <a:headEnd type="none" w="med" len="med"/>
+                      <a:tailEnd type="none" w="med" len="med"/>
+                    </a:lnR>
+                    <a:lnT w="12700" cap="flat" cmpd="sng" algn="ctr">
+                      <a:solidFill>
+                        <a:schemeClr val="tx1"/>
+                      </a:solidFill>
+                      <a:prstDash val="solid"/>
+                      <a:round/>
+                      <a:headEnd type="none" w="med" len="med"/>
+                      <a:tailEnd type="none" w="med" len="med"/>
+                    </a:lnT>
+                    <a:lnB w="12700" cap="flat" cmpd="sng" algn="ctr">
+                      <a:solidFill>
+                        <a:schemeClr val="tx1"/>
+                      </a:solidFill>
+                      <a:prstDash val="solid"/>
+                      <a:round/>
+                      <a:headEnd type="none" w="med" len="med"/>
+                      <a:tailEnd type="none" w="med" len="med"/>
+                    </a:lnB>
+                    <a:solidFill>
+                      <a:schemeClr val="tx2">
+                        <a:lumMod val="40000"/>
+                        <a:lumOff val="60000"/>
+                      </a:schemeClr>
+                    </a:solidFill>
+                  </a:tcPr>
+                </a:tc>
+              </a:tr>
+              <a:tr h="370840">
+                <a:tc>
+                  <a:txBody>
+                    <a:bodyPr/>
+                    <a:lstStyle/>
+                    <a:p>
+                      <a:r>
+                        <a:rPr lang="en-US" b="0" dirty="0" smtClean="0">
+                          <a:solidFill>
+                            <a:schemeClr val="bg1"/>
+                          </a:solidFill>
+                        </a:rPr>
+                        <a:t>RVM </a:t>
+                      </a:r>
+                      <a:r>
+                        <a:rPr lang="en-US" b="0" baseline="0" dirty="0" smtClean="0">
+                          <a:solidFill>
+                            <a:schemeClr val="bg1"/>
+                          </a:solidFill>
+                        </a:rPr>
+                        <a:t>Requirement Wording</a:t>
+                      </a:r>
+                      <a:endParaRPr lang="en-US" b="0" dirty="0">
+                        <a:solidFill>
+                          <a:schemeClr val="bg1"/>
+                        </a:solidFill>
+                      </a:endParaRPr>
+                    </a:p>
+                  </a:txBody>
+                  <a:tcPr anchor="ctr">
+                    <a:lnL w="12700" cap="flat" cmpd="sng" algn="ctr">
+                      <a:solidFill>
+                        <a:schemeClr val="tx1"/>
+                      </a:solidFill>
+                      <a:prstDash val="solid"/>
+                      <a:round/>
+                      <a:headEnd type="none" w="med" len="med"/>
+                      <a:tailEnd type="none" w="med" len="med"/>
+                    </a:lnL>
+                    <a:lnR w="12700" cap="flat" cmpd="sng" algn="ctr">
+                      <a:solidFill>
+                        <a:schemeClr val="tx1"/>
+                      </a:solidFill>
+                      <a:prstDash val="solid"/>
+                      <a:round/>
+                      <a:headEnd type="none" w="med" len="med"/>
+                      <a:tailEnd type="none" w="med" len="med"/>
+                    </a:lnR>
+                    <a:lnT w="12700" cap="flat" cmpd="sng" algn="ctr">
+                      <a:solidFill>
+                        <a:schemeClr val="tx1"/>
+                      </a:solidFill>
+                      <a:prstDash val="solid"/>
+                      <a:round/>
+                      <a:headEnd type="none" w="med" len="med"/>
+                      <a:tailEnd type="none" w="med" len="med"/>
+                    </a:lnT>
+                    <a:lnB w="12700" cap="flat" cmpd="sng" algn="ctr">
+                      <a:solidFill>
+                        <a:schemeClr val="tx1"/>
+                      </a:solidFill>
+                      <a:prstDash val="solid"/>
+                      <a:round/>
+                      <a:headEnd type="none" w="med" len="med"/>
+                      <a:tailEnd type="none" w="med" len="med"/>
+                    </a:lnB>
+                    <a:solidFill>
+                      <a:schemeClr val="tx2">
+                        <a:lumMod val="75000"/>
+                      </a:schemeClr>
+                    </a:solidFill>
+                  </a:tcPr>
+                </a:tc>
+                <a:tc>
+                  <a:txBody>
+                    <a:bodyPr/>
+                    <a:lstStyle/>
+                    <a:p>
+                      <a:r>
+                        <a:rPr lang="en-US" b="1" i="1" dirty="0" smtClean="0">
+                          <a:solidFill>
+                            <a:schemeClr val="tx1"/>
+                          </a:solidFill>
+                        </a:rPr>
+                        <a:t>“Jade and Turquoise</a:t>
+                      </a:r>
+                      <a:r>
+                        <a:rPr lang="en-US" b="1" i="1" baseline="0" dirty="0" smtClean="0">
+                          <a:solidFill>
+                            <a:schemeClr val="tx1"/>
+                          </a:solidFill>
+                        </a:rPr>
+                        <a:t> Shall Record Relative Displacement Data Between Each Other at Least Once a Second</a:t>
+                      </a:r>
+                      <a:r>
+                        <a:rPr lang="en-US" b="1" i="1" dirty="0" smtClean="0">
+                          <a:solidFill>
+                            <a:schemeClr val="tx1"/>
+                          </a:solidFill>
+                        </a:rPr>
+                        <a:t>”</a:t>
+                      </a:r>
+                      <a:endParaRPr lang="en-US" b="1" i="1" dirty="0">
+                        <a:solidFill>
+                          <a:schemeClr val="tx1"/>
+                        </a:solidFill>
+                      </a:endParaRPr>
+                    </a:p>
+                  </a:txBody>
+                  <a:tcPr>
+                    <a:lnL w="12700" cap="flat" cmpd="sng" algn="ctr">
+                      <a:solidFill>
+                        <a:schemeClr val="tx1"/>
+                      </a:solidFill>
+                      <a:prstDash val="solid"/>
+                      <a:round/>
+                      <a:headEnd type="none" w="med" len="med"/>
+                      <a:tailEnd type="none" w="med" len="med"/>
+                    </a:lnL>
+                    <a:lnR w="12700" cap="flat" cmpd="sng" algn="ctr">
+                      <a:solidFill>
+                        <a:schemeClr val="tx1"/>
+                      </a:solidFill>
+                      <a:prstDash val="solid"/>
+                      <a:round/>
+                      <a:headEnd type="none" w="med" len="med"/>
+                      <a:tailEnd type="none" w="med" len="med"/>
+                    </a:lnR>
+                    <a:lnT w="12700" cap="flat" cmpd="sng" algn="ctr">
+                      <a:solidFill>
+                        <a:schemeClr val="tx1"/>
+                      </a:solidFill>
+                      <a:prstDash val="solid"/>
+                      <a:round/>
+                      <a:headEnd type="none" w="med" len="med"/>
+                      <a:tailEnd type="none" w="med" len="med"/>
+                    </a:lnT>
+                    <a:lnB w="12700" cap="flat" cmpd="sng" algn="ctr">
+                      <a:solidFill>
+                        <a:schemeClr val="tx1"/>
+                      </a:solidFill>
+                      <a:prstDash val="solid"/>
+                      <a:round/>
+                      <a:headEnd type="none" w="med" len="med"/>
+                      <a:tailEnd type="none" w="med" len="med"/>
+                    </a:lnB>
+                    <a:solidFill>
+                      <a:schemeClr val="tx2">
+                        <a:lumMod val="40000"/>
+                        <a:lumOff val="60000"/>
+                      </a:schemeClr>
+                    </a:solidFill>
+                  </a:tcPr>
+                </a:tc>
+              </a:tr>
+              <a:tr h="370840">
+                <a:tc>
+                  <a:txBody>
+                    <a:bodyPr/>
+                    <a:lstStyle/>
+                    <a:p>
+                      <a:r>
+                        <a:rPr lang="en-US" b="0" dirty="0" smtClean="0">
+                          <a:solidFill>
+                            <a:schemeClr val="bg1"/>
+                          </a:solidFill>
+                        </a:rPr>
+                        <a:t>Validation Method</a:t>
+                      </a:r>
+                      <a:endParaRPr lang="en-US" b="0" dirty="0">
+                        <a:solidFill>
+                          <a:schemeClr val="bg1"/>
+                        </a:solidFill>
+                      </a:endParaRPr>
+                    </a:p>
+                  </a:txBody>
+                  <a:tcPr anchor="ctr">
+                    <a:lnL w="12700" cap="flat" cmpd="sng" algn="ctr">
+                      <a:solidFill>
+                        <a:schemeClr val="tx1"/>
+                      </a:solidFill>
+                      <a:prstDash val="solid"/>
+                      <a:round/>
+                      <a:headEnd type="none" w="med" len="med"/>
+                      <a:tailEnd type="none" w="med" len="med"/>
+                    </a:lnL>
+                    <a:lnR w="12700" cap="flat" cmpd="sng" algn="ctr">
+                      <a:solidFill>
+                        <a:schemeClr val="tx1"/>
+                      </a:solidFill>
+                      <a:prstDash val="solid"/>
+                      <a:round/>
+                      <a:headEnd type="none" w="med" len="med"/>
+                      <a:tailEnd type="none" w="med" len="med"/>
+                    </a:lnR>
+                    <a:lnT w="12700" cap="flat" cmpd="sng" algn="ctr">
+                      <a:solidFill>
+                        <a:schemeClr val="tx1"/>
+                      </a:solidFill>
+                      <a:prstDash val="solid"/>
+                      <a:round/>
+                      <a:headEnd type="none" w="med" len="med"/>
+                      <a:tailEnd type="none" w="med" len="med"/>
+                    </a:lnT>
+                    <a:lnB w="12700" cap="flat" cmpd="sng" algn="ctr">
+                      <a:solidFill>
+                        <a:schemeClr val="tx1"/>
+                      </a:solidFill>
+                      <a:prstDash val="solid"/>
+                      <a:round/>
+                      <a:headEnd type="none" w="med" len="med"/>
+                      <a:tailEnd type="none" w="med" len="med"/>
+                    </a:lnB>
+                    <a:solidFill>
+                      <a:schemeClr val="tx2">
+                        <a:lumMod val="75000"/>
+                      </a:schemeClr>
+                    </a:solidFill>
+                  </a:tcPr>
+                </a:tc>
+                <a:tc>
+                  <a:txBody>
+                    <a:bodyPr/>
+                    <a:lstStyle/>
+                    <a:p>
+                      <a:r>
+                        <a:rPr lang="en-US" b="1" i="0" dirty="0" smtClean="0">
+                          <a:solidFill>
+                            <a:schemeClr val="tx1"/>
+                          </a:solidFill>
+                        </a:rPr>
+                        <a:t>Analyze</a:t>
+                      </a:r>
+                      <a:endParaRPr lang="en-US" b="1" i="0" dirty="0">
+                        <a:solidFill>
+                          <a:schemeClr val="tx1"/>
+                        </a:solidFill>
+                      </a:endParaRPr>
+                    </a:p>
+                  </a:txBody>
+                  <a:tcPr>
+                    <a:lnL w="12700" cap="flat" cmpd="sng" algn="ctr">
+                      <a:solidFill>
+                        <a:schemeClr val="tx1"/>
+                      </a:solidFill>
+                      <a:prstDash val="solid"/>
+                      <a:round/>
+                      <a:headEnd type="none" w="med" len="med"/>
+                      <a:tailEnd type="none" w="med" len="med"/>
+                    </a:lnL>
+                    <a:lnR w="12700" cap="flat" cmpd="sng" algn="ctr">
+                      <a:solidFill>
+                        <a:schemeClr val="tx1"/>
+                      </a:solidFill>
+                      <a:prstDash val="solid"/>
+                      <a:round/>
+                      <a:headEnd type="none" w="med" len="med"/>
+                      <a:tailEnd type="none" w="med" len="med"/>
+                    </a:lnR>
+                    <a:lnT w="12700" cap="flat" cmpd="sng" algn="ctr">
+                      <a:solidFill>
+                        <a:schemeClr val="tx1"/>
+                      </a:solidFill>
+                      <a:prstDash val="solid"/>
+                      <a:round/>
+                      <a:headEnd type="none" w="med" len="med"/>
+                      <a:tailEnd type="none" w="med" len="med"/>
+                    </a:lnT>
+                    <a:lnB w="12700" cap="flat" cmpd="sng" algn="ctr">
+                      <a:solidFill>
+                        <a:schemeClr val="tx1"/>
+                      </a:solidFill>
+                      <a:prstDash val="solid"/>
+                      <a:round/>
+                      <a:headEnd type="none" w="med" len="med"/>
+                      <a:tailEnd type="none" w="med" len="med"/>
+                    </a:lnB>
+                    <a:solidFill>
+                      <a:schemeClr val="tx2">
+                        <a:lumMod val="40000"/>
+                        <a:lumOff val="60000"/>
+                      </a:schemeClr>
+                    </a:solidFill>
+                  </a:tcPr>
+                </a:tc>
+              </a:tr>
+            </a:tbl>
+          </a:graphicData>
+        </a:graphic>
+      </p:graphicFrame>
+      <p:sp>
+        <p:nvSpPr>
+          <p:cNvPr id="5" name="TextBox 4"/>
+          <p:cNvSpPr txBox="1"/>
+          <p:nvPr/>
+        </p:nvSpPr>
+        <p:spPr>
+          <a:xfrm>
+            <a:off x="457200" y="2971800"/>
+            <a:ext cx="8305800" cy="1200329"/>
+          </a:xfrm>
+          <a:prstGeom prst="rect">
+            <a:avLst/>
+          </a:prstGeom>
+          <a:noFill/>
+        </p:spPr>
+        <p:txBody>
+          <a:bodyPr wrap="square" rtlCol="0">
+            <a:spAutoFit/>
+          </a:bodyPr>
+          <a:lstStyle/>
+          <a:p>
+            <a:pPr algn="just"/>
+            <a:r>
+              <a:rPr lang="en-US" sz="2400" b="1" dirty="0" smtClean="0"/>
+              <a:t>This requirement serves as a means to verifying other requirements associated with the completion Rascal’s primary mission</a:t>
+            </a:r>
+            <a:endParaRPr lang="en-US" sz="2400" b="1" dirty="0" smtClean="0"/>
           </a:p>
         </p:txBody>
       </p:sp>

</xml_diff>